<commit_message>
ppt on the run
</commit_message>
<xml_diff>
--- a/plots/all_drafts.pptx
+++ b/plots/all_drafts.pptx
@@ -12,7 +12,6 @@
     <p:sldId id="261" r:id="rId6"/>
     <p:sldId id="262" r:id="rId7"/>
     <p:sldId id="263" r:id="rId8"/>
-    <p:sldId id="264" r:id="rId9"/>
   </p:sldIdLst>
   <p:sldSz cx="12192000" cy="6858000"/>
   <p:notesSz cx="6858000" cy="9144000"/>
@@ -3356,10 +3355,10 @@
       </p:grpSpPr>
       <p:pic>
         <p:nvPicPr>
-          <p:cNvPr id="3" name="图片 2">
-            <a:extLst>
-              <a:ext uri="{FF2B5EF4-FFF2-40B4-BE49-F238E27FC236}">
-                <a16:creationId xmlns:a16="http://schemas.microsoft.com/office/drawing/2014/main" id="{1896A880-44B5-D0F8-3AAC-286939A8C636}"/>
+          <p:cNvPr id="6" name="图片 5">
+            <a:extLst>
+              <a:ext uri="{FF2B5EF4-FFF2-40B4-BE49-F238E27FC236}">
+                <a16:creationId xmlns:a16="http://schemas.microsoft.com/office/drawing/2014/main" id="{1410AD40-C22E-A7A8-F0D0-2A4A6A797E16}"/>
               </a:ext>
             </a:extLst>
           </p:cNvPr>
@@ -3382,8 +3381,8 @@
         </p:blipFill>
         <p:spPr>
           <a:xfrm>
-            <a:off x="949481" y="0"/>
-            <a:ext cx="10293037" cy="6858000"/>
+            <a:off x="952501" y="1"/>
+            <a:ext cx="10286997" cy="6857999"/>
           </a:xfrm>
           <a:prstGeom prst="rect">
             <a:avLst/>
@@ -3392,7 +3391,7 @@
       </p:pic>
       <p:cxnSp>
         <p:nvCxnSpPr>
-          <p:cNvPr id="4" name="直接箭头连接符 3">
+          <p:cNvPr id="7" name="直接箭头连接符 6">
             <a:extLst>
               <a:ext uri="{FF2B5EF4-FFF2-40B4-BE49-F238E27FC236}">
                 <a16:creationId xmlns:a16="http://schemas.microsoft.com/office/drawing/2014/main" id="{DD984783-8B46-3C7D-25B1-5FAF344D60EE}"/>
@@ -3438,7 +3437,7 @@
       </p:cxnSp>
       <p:sp>
         <p:nvSpPr>
-          <p:cNvPr id="5" name="矩形: 圆角 4">
+          <p:cNvPr id="8" name="矩形: 圆角 7">
             <a:extLst>
               <a:ext uri="{FF2B5EF4-FFF2-40B4-BE49-F238E27FC236}">
                 <a16:creationId xmlns:a16="http://schemas.microsoft.com/office/drawing/2014/main" id="{BB452E1D-E401-B64F-2B2A-F0A25EAF9BC6}"/>
@@ -3571,7 +3570,7 @@
       </p:sp>
       <p:cxnSp>
         <p:nvCxnSpPr>
-          <p:cNvPr id="9" name="直接箭头连接符 8">
+          <p:cNvPr id="10" name="直接箭头连接符 9">
             <a:extLst>
               <a:ext uri="{FF2B5EF4-FFF2-40B4-BE49-F238E27FC236}">
                 <a16:creationId xmlns:a16="http://schemas.microsoft.com/office/drawing/2014/main" id="{4A4F710E-F0A5-1F22-DE5C-45800FAEE9FB}"/>
@@ -3580,7 +3579,7 @@
           </p:cNvPr>
           <p:cNvCxnSpPr>
             <a:cxnSpLocks/>
-            <a:stCxn id="5" idx="0"/>
+            <a:stCxn id="8" idx="0"/>
           </p:cNvCxnSpPr>
           <p:nvPr/>
         </p:nvCxnSpPr>
@@ -3616,7 +3615,7 @@
       </p:cxnSp>
       <p:cxnSp>
         <p:nvCxnSpPr>
-          <p:cNvPr id="12" name="直接箭头连接符 11">
+          <p:cNvPr id="11" name="直接箭头连接符 10">
             <a:extLst>
               <a:ext uri="{FF2B5EF4-FFF2-40B4-BE49-F238E27FC236}">
                 <a16:creationId xmlns:a16="http://schemas.microsoft.com/office/drawing/2014/main" id="{88E65B56-CF62-D925-2DD2-DD3325899E3D}"/>
@@ -3662,7 +3661,7 @@
       </p:cxnSp>
       <p:sp>
         <p:nvSpPr>
-          <p:cNvPr id="15" name="矩形: 圆角 14">
+          <p:cNvPr id="13" name="矩形: 圆角 12">
             <a:extLst>
               <a:ext uri="{FF2B5EF4-FFF2-40B4-BE49-F238E27FC236}">
                 <a16:creationId xmlns:a16="http://schemas.microsoft.com/office/drawing/2014/main" id="{C68B8BEF-8C02-7F2B-8AEF-BD3895FFCB63}"/>
@@ -3745,7 +3744,7 @@
       </p:sp>
       <p:cxnSp>
         <p:nvCxnSpPr>
-          <p:cNvPr id="17" name="直接箭头连接符 16">
+          <p:cNvPr id="14" name="直接箭头连接符 13">
             <a:extLst>
               <a:ext uri="{FF2B5EF4-FFF2-40B4-BE49-F238E27FC236}">
                 <a16:creationId xmlns:a16="http://schemas.microsoft.com/office/drawing/2014/main" id="{E9479988-FC86-A415-24BE-99058F1BF585}"/>
@@ -3754,7 +3753,7 @@
           </p:cNvPr>
           <p:cNvCxnSpPr>
             <a:cxnSpLocks/>
-            <a:stCxn id="15" idx="0"/>
+            <a:stCxn id="13" idx="0"/>
           </p:cNvCxnSpPr>
           <p:nvPr/>
         </p:nvCxnSpPr>
@@ -3790,7 +3789,7 @@
       </p:cxnSp>
       <p:cxnSp>
         <p:nvCxnSpPr>
-          <p:cNvPr id="18" name="直接箭头连接符 17">
+          <p:cNvPr id="16" name="直接箭头连接符 15">
             <a:extLst>
               <a:ext uri="{FF2B5EF4-FFF2-40B4-BE49-F238E27FC236}">
                 <a16:creationId xmlns:a16="http://schemas.microsoft.com/office/drawing/2014/main" id="{555B693D-523D-CB02-EE44-4486E868D67D}"/>
@@ -3866,10 +3865,10 @@
       </p:grpSpPr>
       <p:pic>
         <p:nvPicPr>
-          <p:cNvPr id="7" name="图片 6">
-            <a:extLst>
-              <a:ext uri="{FF2B5EF4-FFF2-40B4-BE49-F238E27FC236}">
-                <a16:creationId xmlns:a16="http://schemas.microsoft.com/office/drawing/2014/main" id="{5AEB4048-B8BD-548C-5ED8-575550C276BC}"/>
+          <p:cNvPr id="3" name="图片 2">
+            <a:extLst>
+              <a:ext uri="{FF2B5EF4-FFF2-40B4-BE49-F238E27FC236}">
+                <a16:creationId xmlns:a16="http://schemas.microsoft.com/office/drawing/2014/main" id="{3E7EAE30-617A-2289-D495-11BAB5DE3318}"/>
               </a:ext>
             </a:extLst>
           </p:cNvPr>
@@ -3892,8 +3891,8 @@
         </p:blipFill>
         <p:spPr>
           <a:xfrm>
-            <a:off x="381001" y="-4777"/>
-            <a:ext cx="11437960" cy="6862777"/>
+            <a:off x="951907" y="0"/>
+            <a:ext cx="10288185" cy="6854765"/>
           </a:xfrm>
           <a:prstGeom prst="rect">
             <a:avLst/>
@@ -3902,7 +3901,7 @@
       </p:pic>
       <p:sp>
         <p:nvSpPr>
-          <p:cNvPr id="8" name="矩形: 圆角 7">
+          <p:cNvPr id="4" name="矩形: 圆角 3">
             <a:extLst>
               <a:ext uri="{FF2B5EF4-FFF2-40B4-BE49-F238E27FC236}">
                 <a16:creationId xmlns:a16="http://schemas.microsoft.com/office/drawing/2014/main" id="{3634421D-09DB-775E-B3C9-A65172C4C675}"/>
@@ -3985,7 +3984,7 @@
       </p:sp>
       <p:cxnSp>
         <p:nvCxnSpPr>
-          <p:cNvPr id="9" name="直接箭头连接符 8">
+          <p:cNvPr id="5" name="直接箭头连接符 4">
             <a:extLst>
               <a:ext uri="{FF2B5EF4-FFF2-40B4-BE49-F238E27FC236}">
                 <a16:creationId xmlns:a16="http://schemas.microsoft.com/office/drawing/2014/main" id="{C42F5BE2-2604-A410-110C-108635EA90D3}"/>
@@ -4029,7 +4028,7 @@
       </p:cxnSp>
       <p:cxnSp>
         <p:nvCxnSpPr>
-          <p:cNvPr id="13" name="直接箭头连接符 12">
+          <p:cNvPr id="6" name="直接箭头连接符 5">
             <a:extLst>
               <a:ext uri="{FF2B5EF4-FFF2-40B4-BE49-F238E27FC236}">
                 <a16:creationId xmlns:a16="http://schemas.microsoft.com/office/drawing/2014/main" id="{B05B362F-6B78-1805-A6C1-22FE0BFD1FDC}"/>
@@ -4075,7 +4074,7 @@
       </p:cxnSp>
       <p:sp>
         <p:nvSpPr>
-          <p:cNvPr id="18" name="矩形: 圆角 17">
+          <p:cNvPr id="10" name="矩形: 圆角 9">
             <a:extLst>
               <a:ext uri="{FF2B5EF4-FFF2-40B4-BE49-F238E27FC236}">
                 <a16:creationId xmlns:a16="http://schemas.microsoft.com/office/drawing/2014/main" id="{F6AAD9A4-B80C-EA42-1F08-5393785A8E8C}"/>
@@ -4158,7 +4157,7 @@
       </p:sp>
       <p:cxnSp>
         <p:nvCxnSpPr>
-          <p:cNvPr id="19" name="直接箭头连接符 18">
+          <p:cNvPr id="11" name="直接箭头连接符 10">
             <a:extLst>
               <a:ext uri="{FF2B5EF4-FFF2-40B4-BE49-F238E27FC236}">
                 <a16:creationId xmlns:a16="http://schemas.microsoft.com/office/drawing/2014/main" id="{F68991BE-C32F-BB7A-A618-C329410C6EEB}"/>
@@ -4204,7 +4203,7 @@
       </p:cxnSp>
       <p:cxnSp>
         <p:nvCxnSpPr>
-          <p:cNvPr id="22" name="直接箭头连接符 21">
+          <p:cNvPr id="12" name="直接箭头连接符 11">
             <a:extLst>
               <a:ext uri="{FF2B5EF4-FFF2-40B4-BE49-F238E27FC236}">
                 <a16:creationId xmlns:a16="http://schemas.microsoft.com/office/drawing/2014/main" id="{9F095785-1E3A-93A7-4E5F-75C81FA51245}"/>
@@ -4278,10 +4277,10 @@
       </p:grpSpPr>
       <p:pic>
         <p:nvPicPr>
-          <p:cNvPr id="6" name="图片 5">
-            <a:extLst>
-              <a:ext uri="{FF2B5EF4-FFF2-40B4-BE49-F238E27FC236}">
-                <a16:creationId xmlns:a16="http://schemas.microsoft.com/office/drawing/2014/main" id="{DEABB820-DCEF-4530-F49E-60DEB3F86021}"/>
+          <p:cNvPr id="3" name="图片 2">
+            <a:extLst>
+              <a:ext uri="{FF2B5EF4-FFF2-40B4-BE49-F238E27FC236}">
+                <a16:creationId xmlns:a16="http://schemas.microsoft.com/office/drawing/2014/main" id="{9B848B4F-E212-993D-D468-9AA0BEEB91C6}"/>
               </a:ext>
             </a:extLst>
           </p:cNvPr>
@@ -4304,8 +4303,8 @@
         </p:blipFill>
         <p:spPr>
           <a:xfrm>
-            <a:off x="944820" y="-6211"/>
-            <a:ext cx="10302359" cy="6864211"/>
+            <a:off x="950688" y="0"/>
+            <a:ext cx="10290624" cy="6858000"/>
           </a:xfrm>
           <a:prstGeom prst="rect">
             <a:avLst/>
@@ -4344,10 +4343,10 @@
       </p:grpSpPr>
       <p:pic>
         <p:nvPicPr>
-          <p:cNvPr id="5" name="图片 4">
-            <a:extLst>
-              <a:ext uri="{FF2B5EF4-FFF2-40B4-BE49-F238E27FC236}">
-                <a16:creationId xmlns:a16="http://schemas.microsoft.com/office/drawing/2014/main" id="{C3DFD036-CB14-E298-8859-21EC499F4F93}"/>
+          <p:cNvPr id="3" name="图片 2">
+            <a:extLst>
+              <a:ext uri="{FF2B5EF4-FFF2-40B4-BE49-F238E27FC236}">
+                <a16:creationId xmlns:a16="http://schemas.microsoft.com/office/drawing/2014/main" id="{0DE470AA-F49C-FD3D-008A-4D9B83663356}"/>
               </a:ext>
             </a:extLst>
           </p:cNvPr>
@@ -4370,8 +4369,8 @@
         </p:blipFill>
         <p:spPr>
           <a:xfrm>
-            <a:off x="380999" y="0"/>
-            <a:ext cx="11429999" cy="6858000"/>
+            <a:off x="906217" y="0"/>
+            <a:ext cx="10379566" cy="6858000"/>
           </a:xfrm>
           <a:prstGeom prst="rect">
             <a:avLst/>
@@ -4408,56 +4407,42 @@
           <a:chExt cx="0" cy="0"/>
         </a:xfrm>
       </p:grpSpPr>
-      <p:sp>
-        <p:nvSpPr>
-          <p:cNvPr id="2" name="标题 1">
-            <a:extLst>
-              <a:ext uri="{FF2B5EF4-FFF2-40B4-BE49-F238E27FC236}">
-                <a16:creationId xmlns:a16="http://schemas.microsoft.com/office/drawing/2014/main" id="{8BF6AF21-CD7A-7D79-A86A-5D6A49C4893A}"/>
-              </a:ext>
-            </a:extLst>
-          </p:cNvPr>
-          <p:cNvSpPr>
-            <a:spLocks noGrp="1"/>
-          </p:cNvSpPr>
-          <p:nvPr>
-            <p:ph type="title"/>
-          </p:nvPr>
-        </p:nvSpPr>
-        <p:spPr/>
-        <p:txBody>
-          <a:bodyPr/>
-          <a:lstStyle/>
-          <a:p>
-            <a:endParaRPr lang="en-US"/>
-          </a:p>
-        </p:txBody>
-      </p:sp>
-      <p:sp>
-        <p:nvSpPr>
-          <p:cNvPr id="3" name="内容占位符 2">
-            <a:extLst>
-              <a:ext uri="{FF2B5EF4-FFF2-40B4-BE49-F238E27FC236}">
-                <a16:creationId xmlns:a16="http://schemas.microsoft.com/office/drawing/2014/main" id="{15F9B719-2CA0-D021-DE0B-C33B3E2ABBF7}"/>
-              </a:ext>
-            </a:extLst>
-          </p:cNvPr>
-          <p:cNvSpPr>
-            <a:spLocks noGrp="1"/>
-          </p:cNvSpPr>
-          <p:nvPr>
-            <p:ph idx="1"/>
-          </p:nvPr>
-        </p:nvSpPr>
-        <p:spPr/>
-        <p:txBody>
-          <a:bodyPr/>
-          <a:lstStyle/>
-          <a:p>
-            <a:endParaRPr lang="en-US"/>
-          </a:p>
-        </p:txBody>
-      </p:sp>
+      <p:pic>
+        <p:nvPicPr>
+          <p:cNvPr id="5" name="图片 4">
+            <a:extLst>
+              <a:ext uri="{FF2B5EF4-FFF2-40B4-BE49-F238E27FC236}">
+                <a16:creationId xmlns:a16="http://schemas.microsoft.com/office/drawing/2014/main" id="{5AB12BF7-A287-2287-D7E4-C76C3B97598F}"/>
+              </a:ext>
+            </a:extLst>
+          </p:cNvPr>
+          <p:cNvPicPr>
+            <a:picLocks noChangeAspect="1"/>
+          </p:cNvPicPr>
+          <p:nvPr/>
+        </p:nvPicPr>
+        <p:blipFill>
+          <a:blip r:embed="rId2">
+            <a:extLst>
+              <a:ext uri="{28A0092B-C50C-407E-A947-70E740481C1C}">
+                <a14:useLocalDpi xmlns:a14="http://schemas.microsoft.com/office/drawing/2010/main" val="0"/>
+              </a:ext>
+            </a:extLst>
+          </a:blip>
+          <a:stretch>
+            <a:fillRect/>
+          </a:stretch>
+        </p:blipFill>
+        <p:spPr>
+          <a:xfrm>
+            <a:off x="944820" y="-6210"/>
+            <a:ext cx="10302360" cy="6864210"/>
+          </a:xfrm>
+          <a:prstGeom prst="rect">
+            <a:avLst/>
+          </a:prstGeom>
+        </p:spPr>
+      </p:pic>
     </p:spTree>
     <p:extLst>
       <p:ext uri="{BB962C8B-B14F-4D97-AF65-F5344CB8AC3E}">
@@ -4488,56 +4473,42 @@
           <a:chExt cx="0" cy="0"/>
         </a:xfrm>
       </p:grpSpPr>
-      <p:sp>
-        <p:nvSpPr>
-          <p:cNvPr id="2" name="标题 1">
-            <a:extLst>
-              <a:ext uri="{FF2B5EF4-FFF2-40B4-BE49-F238E27FC236}">
-                <a16:creationId xmlns:a16="http://schemas.microsoft.com/office/drawing/2014/main" id="{52BE9713-C5FF-5F98-7911-D16724705ED2}"/>
-              </a:ext>
-            </a:extLst>
-          </p:cNvPr>
-          <p:cNvSpPr>
-            <a:spLocks noGrp="1"/>
-          </p:cNvSpPr>
-          <p:nvPr>
-            <p:ph type="title"/>
-          </p:nvPr>
-        </p:nvSpPr>
-        <p:spPr/>
-        <p:txBody>
-          <a:bodyPr/>
-          <a:lstStyle/>
-          <a:p>
-            <a:endParaRPr lang="en-US"/>
-          </a:p>
-        </p:txBody>
-      </p:sp>
-      <p:sp>
-        <p:nvSpPr>
-          <p:cNvPr id="3" name="内容占位符 2">
-            <a:extLst>
-              <a:ext uri="{FF2B5EF4-FFF2-40B4-BE49-F238E27FC236}">
-                <a16:creationId xmlns:a16="http://schemas.microsoft.com/office/drawing/2014/main" id="{B4432F88-DABC-552A-C347-8FE7CD7F7F80}"/>
-              </a:ext>
-            </a:extLst>
-          </p:cNvPr>
-          <p:cNvSpPr>
-            <a:spLocks noGrp="1"/>
-          </p:cNvSpPr>
-          <p:nvPr>
-            <p:ph idx="1"/>
-          </p:nvPr>
-        </p:nvSpPr>
-        <p:spPr/>
-        <p:txBody>
-          <a:bodyPr/>
-          <a:lstStyle/>
-          <a:p>
-            <a:endParaRPr lang="en-US"/>
-          </a:p>
-        </p:txBody>
-      </p:sp>
+      <p:pic>
+        <p:nvPicPr>
+          <p:cNvPr id="5" name="图片 4">
+            <a:extLst>
+              <a:ext uri="{FF2B5EF4-FFF2-40B4-BE49-F238E27FC236}">
+                <a16:creationId xmlns:a16="http://schemas.microsoft.com/office/drawing/2014/main" id="{B508BF21-1B1A-EBA7-910D-4E0ACB867650}"/>
+              </a:ext>
+            </a:extLst>
+          </p:cNvPr>
+          <p:cNvPicPr>
+            <a:picLocks noChangeAspect="1"/>
+          </p:cNvPicPr>
+          <p:nvPr/>
+        </p:nvPicPr>
+        <p:blipFill>
+          <a:blip r:embed="rId2">
+            <a:extLst>
+              <a:ext uri="{28A0092B-C50C-407E-A947-70E740481C1C}">
+                <a14:useLocalDpi xmlns:a14="http://schemas.microsoft.com/office/drawing/2010/main" val="0"/>
+              </a:ext>
+            </a:extLst>
+          </a:blip>
+          <a:stretch>
+            <a:fillRect/>
+          </a:stretch>
+        </p:blipFill>
+        <p:spPr>
+          <a:xfrm>
+            <a:off x="952769" y="0"/>
+            <a:ext cx="10286461" cy="6857641"/>
+          </a:xfrm>
+          <a:prstGeom prst="rect">
+            <a:avLst/>
+          </a:prstGeom>
+        </p:spPr>
+      </p:pic>
     </p:spTree>
     <p:extLst>
       <p:ext uri="{BB962C8B-B14F-4D97-AF65-F5344CB8AC3E}">
@@ -4608,36 +4579,6 @@
     <p:extLst>
       <p:ext uri="{BB962C8B-B14F-4D97-AF65-F5344CB8AC3E}">
         <p14:creationId xmlns:p14="http://schemas.microsoft.com/office/powerpoint/2010/main" val="3162193794"/>
-      </p:ext>
-    </p:extLst>
-  </p:cSld>
-  <p:clrMapOvr>
-    <a:masterClrMapping/>
-  </p:clrMapOvr>
-</p:sld>
-</file>
-
-<file path=ppt/slides/slide8.xml><?xml version="1.0" encoding="utf-8"?>
-<p:sld xmlns:a="http://schemas.openxmlformats.org/drawingml/2006/main" xmlns:r="http://schemas.openxmlformats.org/officeDocument/2006/relationships" xmlns:p="http://schemas.openxmlformats.org/presentationml/2006/main">
-  <p:cSld>
-    <p:spTree>
-      <p:nvGrpSpPr>
-        <p:cNvPr id="1" name=""/>
-        <p:cNvGrpSpPr/>
-        <p:nvPr/>
-      </p:nvGrpSpPr>
-      <p:grpSpPr>
-        <a:xfrm>
-          <a:off x="0" y="0"/>
-          <a:ext cx="0" cy="0"/>
-          <a:chOff x="0" y="0"/>
-          <a:chExt cx="0" cy="0"/>
-        </a:xfrm>
-      </p:grpSpPr>
-    </p:spTree>
-    <p:extLst>
-      <p:ext uri="{BB962C8B-B14F-4D97-AF65-F5344CB8AC3E}">
-        <p14:creationId xmlns:p14="http://schemas.microsoft.com/office/powerpoint/2010/main" val="254025292"/>
       </p:ext>
     </p:extLst>
   </p:cSld>

</xml_diff>